<commit_message>
Make final changes and finish the project
Co-authored-by: Gospodin Radev <GSRadev21@codingburgas.bg>
Co-authored-by: Teodor Tanev <TDTanev21@codingburgas.bg>
Co-authored-by: Filipa Popova <FHPopova21@codingburgas.bg>
</commit_message>
<xml_diff>
--- a/docs/presentation/Horizon.pptx
+++ b/docs/presentation/Horizon.pptx
@@ -292,7 +292,7 @@
 <file path=ppt/revisionInfo.xml><?xml version="1.0" encoding="utf-8"?>
 <p1510:revInfo xmlns:a="http://schemas.openxmlformats.org/drawingml/2006/main" xmlns:r="http://schemas.openxmlformats.org/officeDocument/2006/relationships" xmlns:p1510="http://schemas.microsoft.com/office/powerpoint/2015/10/main">
   <p1510:revLst>
-    <p1510:client id="{978BEEFD-62D3-4C91-BFC4-F47A4EEB444E}" v="32" dt="2024-01-23T19:29:45.699"/>
+    <p1510:client id="{978BEEFD-62D3-4C91-BFC4-F47A4EEB444E}" v="52" dt="2024-01-23T21:39:58.916"/>
   </p1510:revLst>
 </p1510:revInfo>
 </file>
@@ -302,7 +302,7 @@
   <pc:docChgLst>
     <pc:chgData name="Божидар Димов" userId="6c33bdc79629dce9" providerId="LiveId" clId="{978BEEFD-62D3-4C91-BFC4-F47A4EEB444E}"/>
     <pc:docChg chg="custSel modSld">
-      <pc:chgData name="Божидар Димов" userId="6c33bdc79629dce9" providerId="LiveId" clId="{978BEEFD-62D3-4C91-BFC4-F47A4EEB444E}" dt="2024-01-23T19:31:27.870" v="114" actId="20577"/>
+      <pc:chgData name="Божидар Димов" userId="6c33bdc79629dce9" providerId="LiveId" clId="{978BEEFD-62D3-4C91-BFC4-F47A4EEB444E}" dt="2024-01-23T21:40:03.994" v="148" actId="1076"/>
       <pc:docMkLst>
         <pc:docMk/>
       </pc:docMkLst>
@@ -353,17 +353,33 @@
         </pc:spChg>
       </pc:sldChg>
       <pc:sldChg chg="addSp delSp modSp mod">
-        <pc:chgData name="Божидар Димов" userId="6c33bdc79629dce9" providerId="LiveId" clId="{978BEEFD-62D3-4C91-BFC4-F47A4EEB444E}" dt="2024-01-23T19:30:44.845" v="111" actId="1076"/>
+        <pc:chgData name="Божидар Димов" userId="6c33bdc79629dce9" providerId="LiveId" clId="{978BEEFD-62D3-4C91-BFC4-F47A4EEB444E}" dt="2024-01-23T21:40:03.994" v="148" actId="1076"/>
         <pc:sldMkLst>
           <pc:docMk/>
           <pc:sldMk cId="0" sldId="266"/>
         </pc:sldMkLst>
         <pc:picChg chg="add mod">
-          <ac:chgData name="Божидар Димов" userId="6c33bdc79629dce9" providerId="LiveId" clId="{978BEEFD-62D3-4C91-BFC4-F47A4EEB444E}" dt="2024-01-23T19:30:44.845" v="111" actId="1076"/>
+          <ac:chgData name="Божидар Димов" userId="6c33bdc79629dce9" providerId="LiveId" clId="{978BEEFD-62D3-4C91-BFC4-F47A4EEB444E}" dt="2024-01-23T21:39:17.186" v="138" actId="1076"/>
+          <ac:picMkLst>
+            <pc:docMk/>
+            <pc:sldMk cId="0" sldId="266"/>
+            <ac:picMk id="2" creationId="{875AF4AD-A423-33E3-FC5A-DC3428BBDF92}"/>
+          </ac:picMkLst>
+        </pc:picChg>
+        <pc:picChg chg="add mod">
+          <ac:chgData name="Божидар Димов" userId="6c33bdc79629dce9" providerId="LiveId" clId="{978BEEFD-62D3-4C91-BFC4-F47A4EEB444E}" dt="2024-01-23T21:40:03.994" v="148" actId="1076"/>
           <ac:picMkLst>
             <pc:docMk/>
             <pc:sldMk cId="0" sldId="266"/>
             <ac:picMk id="3" creationId="{482C7D88-2E71-E894-C7AE-67DE8AFCAB3C}"/>
+          </ac:picMkLst>
+        </pc:picChg>
+        <pc:picChg chg="add mod">
+          <ac:chgData name="Божидар Димов" userId="6c33bdc79629dce9" providerId="LiveId" clId="{978BEEFD-62D3-4C91-BFC4-F47A4EEB444E}" dt="2024-01-23T21:39:58.916" v="147" actId="1076"/>
+          <ac:picMkLst>
+            <pc:docMk/>
+            <pc:sldMk cId="0" sldId="266"/>
+            <ac:picMk id="4" creationId="{4121AE5D-2474-138A-A097-56A98B871D80}"/>
           </ac:picMkLst>
         </pc:picChg>
         <pc:picChg chg="mod">
@@ -383,7 +399,7 @@
           </ac:picMkLst>
         </pc:picChg>
         <pc:picChg chg="mod">
-          <ac:chgData name="Божидар Димов" userId="6c33bdc79629dce9" providerId="LiveId" clId="{978BEEFD-62D3-4C91-BFC4-F47A4EEB444E}" dt="2024-01-23T19:30:29.661" v="107" actId="1076"/>
+          <ac:chgData name="Божидар Димов" userId="6c33bdc79629dce9" providerId="LiveId" clId="{978BEEFD-62D3-4C91-BFC4-F47A4EEB444E}" dt="2024-01-23T21:39:57.026" v="146" actId="1076"/>
           <ac:picMkLst>
             <pc:docMk/>
             <pc:sldMk cId="0" sldId="266"/>
@@ -391,7 +407,7 @@
           </ac:picMkLst>
         </pc:picChg>
         <pc:picChg chg="mod">
-          <ac:chgData name="Божидар Димов" userId="6c33bdc79629dce9" providerId="LiveId" clId="{978BEEFD-62D3-4C91-BFC4-F47A4EEB444E}" dt="2024-01-23T19:30:15.347" v="99" actId="1076"/>
+          <ac:chgData name="Божидар Димов" userId="6c33bdc79629dce9" providerId="LiveId" clId="{978BEEFD-62D3-4C91-BFC4-F47A4EEB444E}" dt="2024-01-23T21:39:15.100" v="137" actId="1076"/>
           <ac:picMkLst>
             <pc:docMk/>
             <pc:sldMk cId="0" sldId="266"/>
@@ -415,7 +431,7 @@
           </ac:picMkLst>
         </pc:picChg>
         <pc:picChg chg="mod">
-          <ac:chgData name="Божидар Димов" userId="6c33bdc79629dce9" providerId="LiveId" clId="{978BEEFD-62D3-4C91-BFC4-F47A4EEB444E}" dt="2024-01-23T19:30:24.829" v="105" actId="1076"/>
+          <ac:chgData name="Божидар Димов" userId="6c33bdc79629dce9" providerId="LiveId" clId="{978BEEFD-62D3-4C91-BFC4-F47A4EEB444E}" dt="2024-01-23T21:38:50.860" v="127" actId="1076"/>
           <ac:picMkLst>
             <pc:docMk/>
             <pc:sldMk cId="0" sldId="266"/>
@@ -455,7 +471,7 @@
           </ac:picMkLst>
         </pc:picChg>
         <pc:picChg chg="add mod">
-          <ac:chgData name="Божидар Димов" userId="6c33bdc79629dce9" providerId="LiveId" clId="{978BEEFD-62D3-4C91-BFC4-F47A4EEB444E}" dt="2024-01-23T19:29:45.699" v="96" actId="1076"/>
+          <ac:chgData name="Божидар Димов" userId="6c33bdc79629dce9" providerId="LiveId" clId="{978BEEFD-62D3-4C91-BFC4-F47A4EEB444E}" dt="2024-01-23T21:39:19.815" v="139" actId="1076"/>
           <ac:picMkLst>
             <pc:docMk/>
             <pc:sldMk cId="0" sldId="266"/>
@@ -10238,15 +10254,6 @@
           <a:effectLst>
             <a:reflection blurRad="12700" stA="38000" endPos="28000" dist="5000" dir="5400000" sy="-100000" algn="bl" rotWithShape="0"/>
           </a:effectLst>
-          <a:extLst>
-            <a:ext uri="{909E8E84-426E-40DD-AFC4-6F175D3DCCD1}">
-              <a14:hiddenFill xmlns:a14="http://schemas.microsoft.com/office/drawing/2010/main">
-                <a:solidFill>
-                  <a:srgbClr val="FFFFFF"/>
-                </a:solidFill>
-              </a14:hiddenFill>
-            </a:ext>
-          </a:extLst>
         </p:spPr>
       </p:pic>
       <p:pic>
@@ -10289,15 +10296,6 @@
           <a:effectLst>
             <a:reflection blurRad="12700" stA="38000" endPos="28000" dist="5000" dir="5400000" sy="-100000" algn="bl" rotWithShape="0"/>
           </a:effectLst>
-          <a:extLst>
-            <a:ext uri="{909E8E84-426E-40DD-AFC4-6F175D3DCCD1}">
-              <a14:hiddenFill xmlns:a14="http://schemas.microsoft.com/office/drawing/2010/main">
-                <a:solidFill>
-                  <a:srgbClr val="FFFFFF"/>
-                </a:solidFill>
-              </a14:hiddenFill>
-            </a:ext>
-          </a:extLst>
         </p:spPr>
       </p:pic>
       <p:pic>
@@ -10340,15 +10338,6 @@
           <a:effectLst>
             <a:reflection blurRad="12700" stA="38000" endPos="28000" dist="5000" dir="5400000" sy="-100000" algn="bl" rotWithShape="0"/>
           </a:effectLst>
-          <a:extLst>
-            <a:ext uri="{909E8E84-426E-40DD-AFC4-6F175D3DCCD1}">
-              <a14:hiddenFill xmlns:a14="http://schemas.microsoft.com/office/drawing/2010/main">
-                <a:solidFill>
-                  <a:srgbClr val="FFFFFF"/>
-                </a:solidFill>
-              </a14:hiddenFill>
-            </a:ext>
-          </a:extLst>
         </p:spPr>
       </p:pic>
       <p:sp>
@@ -10688,15 +10677,6 @@
           <a:effectLst>
             <a:reflection blurRad="12700" stA="38000" endPos="28000" dist="5000" dir="5400000" sy="-100000" algn="bl" rotWithShape="0"/>
           </a:effectLst>
-          <a:extLst>
-            <a:ext uri="{909E8E84-426E-40DD-AFC4-6F175D3DCCD1}">
-              <a14:hiddenFill xmlns:a14="http://schemas.microsoft.com/office/drawing/2010/main">
-                <a:solidFill>
-                  <a:srgbClr val="FFFFFF"/>
-                </a:solidFill>
-              </a14:hiddenFill>
-            </a:ext>
-          </a:extLst>
         </p:spPr>
       </p:pic>
     </p:spTree>
@@ -13040,8 +13020,8 @@
         </p:blipFill>
         <p:spPr>
           <a:xfrm>
-            <a:off x="3456514" y="2178019"/>
-            <a:ext cx="986049" cy="1108484"/>
+            <a:off x="4589718" y="1926877"/>
+            <a:ext cx="1147289" cy="1289745"/>
           </a:xfrm>
           <a:prstGeom prst="rect">
             <a:avLst/>
@@ -13076,7 +13056,7 @@
         </p:blipFill>
         <p:spPr>
           <a:xfrm>
-            <a:off x="5373968" y="2889796"/>
+            <a:off x="5693328" y="3234903"/>
             <a:ext cx="1255886" cy="1255886"/>
           </a:xfrm>
           <a:prstGeom prst="rect">
@@ -13157,7 +13137,7 @@
         </p:blipFill>
         <p:spPr>
           <a:xfrm>
-            <a:off x="6797798" y="1733347"/>
+            <a:off x="6949214" y="279609"/>
             <a:ext cx="986049" cy="986049"/>
           </a:xfrm>
           <a:prstGeom prst="rect">
@@ -13278,7 +13258,7 @@
         </p:blipFill>
         <p:spPr bwMode="auto">
           <a:xfrm>
-            <a:off x="7290823" y="3035477"/>
+            <a:off x="7579347" y="3254329"/>
             <a:ext cx="1125603" cy="1125603"/>
           </a:xfrm>
           <a:prstGeom prst="rect">
@@ -13318,12 +13298,106 @@
         </p:blipFill>
         <p:spPr>
           <a:xfrm>
-            <a:off x="4373355" y="772634"/>
+            <a:off x="5023286" y="540436"/>
             <a:ext cx="2303961" cy="1728969"/>
           </a:xfrm>
           <a:prstGeom prst="rect">
             <a:avLst/>
           </a:prstGeom>
+        </p:spPr>
+      </p:pic>
+      <p:pic>
+        <p:nvPicPr>
+          <p:cNvPr id="2" name="Picture 2">
+            <a:extLst>
+              <a:ext uri="{FF2B5EF4-FFF2-40B4-BE49-F238E27FC236}">
+                <a16:creationId xmlns:a16="http://schemas.microsoft.com/office/drawing/2014/main" id="{875AF4AD-A423-33E3-FC5A-DC3428BBDF92}"/>
+              </a:ext>
+            </a:extLst>
+          </p:cNvPr>
+          <p:cNvPicPr>
+            <a:picLocks noChangeAspect="1" noChangeArrowheads="1"/>
+          </p:cNvPicPr>
+          <p:nvPr/>
+        </p:nvPicPr>
+        <p:blipFill>
+          <a:blip r:embed="rId18">
+            <a:extLst>
+              <a:ext uri="{28A0092B-C50C-407E-A947-70E740481C1C}">
+                <a14:useLocalDpi xmlns:a14="http://schemas.microsoft.com/office/drawing/2010/main" val="0"/>
+              </a:ext>
+            </a:extLst>
+          </a:blip>
+          <a:srcRect/>
+          <a:stretch>
+            <a:fillRect/>
+          </a:stretch>
+        </p:blipFill>
+        <p:spPr bwMode="auto">
+          <a:xfrm>
+            <a:off x="6839997" y="1699680"/>
+            <a:ext cx="1230000" cy="1230000"/>
+          </a:xfrm>
+          <a:prstGeom prst="rect">
+            <a:avLst/>
+          </a:prstGeom>
+          <a:noFill/>
+          <a:extLst>
+            <a:ext uri="{909E8E84-426E-40DD-AFC4-6F175D3DCCD1}">
+              <a14:hiddenFill xmlns:a14="http://schemas.microsoft.com/office/drawing/2010/main">
+                <a:solidFill>
+                  <a:srgbClr val="FFFFFF"/>
+                </a:solidFill>
+              </a14:hiddenFill>
+            </a:ext>
+          </a:extLst>
+        </p:spPr>
+      </p:pic>
+      <p:pic>
+        <p:nvPicPr>
+          <p:cNvPr id="4" name="Picture 2">
+            <a:extLst>
+              <a:ext uri="{FF2B5EF4-FFF2-40B4-BE49-F238E27FC236}">
+                <a16:creationId xmlns:a16="http://schemas.microsoft.com/office/drawing/2014/main" id="{4121AE5D-2474-138A-A097-56A98B871D80}"/>
+              </a:ext>
+            </a:extLst>
+          </p:cNvPr>
+          <p:cNvPicPr>
+            <a:picLocks noChangeAspect="1" noChangeArrowheads="1"/>
+          </p:cNvPicPr>
+          <p:nvPr/>
+        </p:nvPicPr>
+        <p:blipFill>
+          <a:blip r:embed="rId19">
+            <a:extLst>
+              <a:ext uri="{28A0092B-C50C-407E-A947-70E740481C1C}">
+                <a14:useLocalDpi xmlns:a14="http://schemas.microsoft.com/office/drawing/2010/main" val="0"/>
+              </a:ext>
+            </a:extLst>
+          </a:blip>
+          <a:srcRect/>
+          <a:stretch>
+            <a:fillRect/>
+          </a:stretch>
+        </p:blipFill>
+        <p:spPr bwMode="auto">
+          <a:xfrm>
+            <a:off x="2986159" y="2329530"/>
+            <a:ext cx="1255886" cy="1376081"/>
+          </a:xfrm>
+          <a:prstGeom prst="rect">
+            <a:avLst/>
+          </a:prstGeom>
+          <a:noFill/>
+          <a:extLst>
+            <a:ext uri="{909E8E84-426E-40DD-AFC4-6F175D3DCCD1}">
+              <a14:hiddenFill xmlns:a14="http://schemas.microsoft.com/office/drawing/2010/main">
+                <a:solidFill>
+                  <a:srgbClr val="FFFFFF"/>
+                </a:solidFill>
+              </a14:hiddenFill>
+            </a:ext>
+          </a:extLst>
         </p:spPr>
       </p:pic>
     </p:spTree>

</xml_diff>